<commit_message>
first compiled version of trained model framework
</commit_message>
<xml_diff>
--- a/semisupervisedFramework/Architecture.pptx
+++ b/semisupervisedFramework/Architecture.pptx
@@ -104,6 +104,11 @@
       </a:defRPr>
     </a:lvl9pPr>
   </p:defaultTextStyle>
+  <p:extLst>
+    <p:ext uri="{EFAFB233-063F-42B5-8137-9DF3F51BA10A}">
+      <p15:sldGuideLst xmlns:p15="http://schemas.microsoft.com/office/powerpoint/2012/main"/>
+    </p:ext>
+  </p:extLst>
 </p:presentation>
 </file>
 
@@ -254,7 +259,7 @@
           <a:p>
             <a:fld id="{291BD508-DA94-4AF0-BB40-09E8F434B63E}" type="datetimeFigureOut">
               <a:rPr lang="en-US" smtClean="0"/>
-              <a:t>7/27/2019</a:t>
+              <a:t>8/14/2019</a:t>
             </a:fld>
             <a:endParaRPr lang="en-US"/>
           </a:p>
@@ -452,7 +457,7 @@
           <a:p>
             <a:fld id="{291BD508-DA94-4AF0-BB40-09E8F434B63E}" type="datetimeFigureOut">
               <a:rPr lang="en-US" smtClean="0"/>
-              <a:t>7/27/2019</a:t>
+              <a:t>8/14/2019</a:t>
             </a:fld>
             <a:endParaRPr lang="en-US"/>
           </a:p>
@@ -660,7 +665,7 @@
           <a:p>
             <a:fld id="{291BD508-DA94-4AF0-BB40-09E8F434B63E}" type="datetimeFigureOut">
               <a:rPr lang="en-US" smtClean="0"/>
-              <a:t>7/27/2019</a:t>
+              <a:t>8/14/2019</a:t>
             </a:fld>
             <a:endParaRPr lang="en-US"/>
           </a:p>
@@ -858,7 +863,7 @@
           <a:p>
             <a:fld id="{291BD508-DA94-4AF0-BB40-09E8F434B63E}" type="datetimeFigureOut">
               <a:rPr lang="en-US" smtClean="0"/>
-              <a:t>7/27/2019</a:t>
+              <a:t>8/14/2019</a:t>
             </a:fld>
             <a:endParaRPr lang="en-US"/>
           </a:p>
@@ -1133,7 +1138,7 @@
           <a:p>
             <a:fld id="{291BD508-DA94-4AF0-BB40-09E8F434B63E}" type="datetimeFigureOut">
               <a:rPr lang="en-US" smtClean="0"/>
-              <a:t>7/27/2019</a:t>
+              <a:t>8/14/2019</a:t>
             </a:fld>
             <a:endParaRPr lang="en-US"/>
           </a:p>
@@ -1398,7 +1403,7 @@
           <a:p>
             <a:fld id="{291BD508-DA94-4AF0-BB40-09E8F434B63E}" type="datetimeFigureOut">
               <a:rPr lang="en-US" smtClean="0"/>
-              <a:t>7/27/2019</a:t>
+              <a:t>8/14/2019</a:t>
             </a:fld>
             <a:endParaRPr lang="en-US"/>
           </a:p>
@@ -1810,7 +1815,7 @@
           <a:p>
             <a:fld id="{291BD508-DA94-4AF0-BB40-09E8F434B63E}" type="datetimeFigureOut">
               <a:rPr lang="en-US" smtClean="0"/>
-              <a:t>7/27/2019</a:t>
+              <a:t>8/14/2019</a:t>
             </a:fld>
             <a:endParaRPr lang="en-US"/>
           </a:p>
@@ -1951,7 +1956,7 @@
           <a:p>
             <a:fld id="{291BD508-DA94-4AF0-BB40-09E8F434B63E}" type="datetimeFigureOut">
               <a:rPr lang="en-US" smtClean="0"/>
-              <a:t>7/27/2019</a:t>
+              <a:t>8/14/2019</a:t>
             </a:fld>
             <a:endParaRPr lang="en-US"/>
           </a:p>
@@ -2064,7 +2069,7 @@
           <a:p>
             <a:fld id="{291BD508-DA94-4AF0-BB40-09E8F434B63E}" type="datetimeFigureOut">
               <a:rPr lang="en-US" smtClean="0"/>
-              <a:t>7/27/2019</a:t>
+              <a:t>8/14/2019</a:t>
             </a:fld>
             <a:endParaRPr lang="en-US"/>
           </a:p>
@@ -2375,7 +2380,7 @@
           <a:p>
             <a:fld id="{291BD508-DA94-4AF0-BB40-09E8F434B63E}" type="datetimeFigureOut">
               <a:rPr lang="en-US" smtClean="0"/>
-              <a:t>7/27/2019</a:t>
+              <a:t>8/14/2019</a:t>
             </a:fld>
             <a:endParaRPr lang="en-US"/>
           </a:p>
@@ -2663,7 +2668,7 @@
           <a:p>
             <a:fld id="{291BD508-DA94-4AF0-BB40-09E8F434B63E}" type="datetimeFigureOut">
               <a:rPr lang="en-US" smtClean="0"/>
-              <a:t>7/27/2019</a:t>
+              <a:t>8/14/2019</a:t>
             </a:fld>
             <a:endParaRPr lang="en-US"/>
           </a:p>
@@ -2904,7 +2909,7 @@
           <a:p>
             <a:fld id="{291BD508-DA94-4AF0-BB40-09E8F434B63E}" type="datetimeFigureOut">
               <a:rPr lang="en-US" smtClean="0"/>
-              <a:t>7/27/2019</a:t>
+              <a:t>8/14/2019</a:t>
             </a:fld>
             <a:endParaRPr lang="en-US"/>
           </a:p>
@@ -3321,119 +3326,98 @@
           <a:chExt cx="0" cy="0"/>
         </a:xfrm>
       </p:grpSpPr>
-      <p:grpSp>
-        <p:nvGrpSpPr>
-          <p:cNvPr id="71" name="Group 70">
-            <a:extLst>
-              <a:ext uri="{FF2B5EF4-FFF2-40B4-BE49-F238E27FC236}">
-                <a16:creationId xmlns:a16="http://schemas.microsoft.com/office/drawing/2014/main" id="{447154E6-0035-4C89-AEB4-A9062A9026C7}"/>
-              </a:ext>
-            </a:extLst>
-          </p:cNvPr>
-          <p:cNvGrpSpPr/>
+      <p:pic>
+        <p:nvPicPr>
+          <p:cNvPr id="68" name="Picture 67">
+            <a:extLst>
+              <a:ext uri="{FF2B5EF4-FFF2-40B4-BE49-F238E27FC236}">
+                <a16:creationId xmlns:a16="http://schemas.microsoft.com/office/drawing/2014/main" id="{5795C577-CE51-40DA-88D7-2C13DD589BEB}"/>
+              </a:ext>
+            </a:extLst>
+          </p:cNvPr>
+          <p:cNvPicPr>
+            <a:picLocks noChangeAspect="1"/>
+          </p:cNvPicPr>
           <p:nvPr/>
-        </p:nvGrpSpPr>
-        <p:grpSpPr>
+        </p:nvPicPr>
+        <p:blipFill>
+          <a:blip r:embed="rId2">
+            <a:extLst>
+              <a:ext uri="{28A0092B-C50C-407E-A947-70E740481C1C}">
+                <a14:useLocalDpi xmlns:a14="http://schemas.microsoft.com/office/drawing/2010/main" val="0"/>
+              </a:ext>
+            </a:extLst>
+          </a:blip>
+          <a:stretch>
+            <a:fillRect/>
+          </a:stretch>
+        </p:blipFill>
+        <p:spPr>
           <a:xfrm>
             <a:off x="3431379" y="2379944"/>
             <a:ext cx="1162102" cy="1162102"/>
-            <a:chOff x="4071648" y="127483"/>
-            <a:chExt cx="1162102" cy="1162102"/>
           </a:xfrm>
-        </p:grpSpPr>
-        <p:pic>
-          <p:nvPicPr>
-            <p:cNvPr id="68" name="Picture 67">
-              <a:extLst>
-                <a:ext uri="{FF2B5EF4-FFF2-40B4-BE49-F238E27FC236}">
-                  <a16:creationId xmlns:a16="http://schemas.microsoft.com/office/drawing/2014/main" id="{5795C577-CE51-40DA-88D7-2C13DD589BEB}"/>
-                </a:ext>
-              </a:extLst>
-            </p:cNvPr>
-            <p:cNvPicPr>
-              <a:picLocks noChangeAspect="1"/>
-            </p:cNvPicPr>
-            <p:nvPr/>
-          </p:nvPicPr>
-          <p:blipFill>
-            <a:blip r:embed="rId2">
-              <a:extLst>
-                <a:ext uri="{28A0092B-C50C-407E-A947-70E740481C1C}">
-                  <a14:useLocalDpi xmlns:a14="http://schemas.microsoft.com/office/drawing/2010/main" val="0"/>
-                </a:ext>
-              </a:extLst>
-            </a:blip>
-            <a:stretch>
-              <a:fillRect/>
-            </a:stretch>
-          </p:blipFill>
-          <p:spPr>
-            <a:xfrm>
-              <a:off x="4071648" y="127483"/>
-              <a:ext cx="1162102" cy="1162102"/>
-            </a:xfrm>
-            <a:prstGeom prst="rect">
-              <a:avLst/>
-            </a:prstGeom>
-          </p:spPr>
-        </p:pic>
-        <p:sp>
-          <p:nvSpPr>
-            <p:cNvPr id="69" name="Oval 68">
-              <a:extLst>
-                <a:ext uri="{FF2B5EF4-FFF2-40B4-BE49-F238E27FC236}">
-                  <a16:creationId xmlns:a16="http://schemas.microsoft.com/office/drawing/2014/main" id="{E29F8453-1C90-4590-A696-78ED654CFD8E}"/>
-                </a:ext>
-              </a:extLst>
-            </p:cNvPr>
-            <p:cNvSpPr/>
-            <p:nvPr/>
-          </p:nvSpPr>
-          <p:spPr>
-            <a:xfrm>
-              <a:off x="4414650" y="450047"/>
-              <a:ext cx="502482" cy="511297"/>
-            </a:xfrm>
-            <a:prstGeom prst="ellipse">
-              <a:avLst/>
-            </a:prstGeom>
-            <a:solidFill>
-              <a:schemeClr val="bg1"/>
-            </a:solidFill>
-            <a:ln>
-              <a:noFill/>
-            </a:ln>
-          </p:spPr>
-          <p:style>
-            <a:lnRef idx="2">
-              <a:schemeClr val="accent1">
-                <a:shade val="50000"/>
-              </a:schemeClr>
-            </a:lnRef>
-            <a:fillRef idx="1">
-              <a:schemeClr val="accent1"/>
-            </a:fillRef>
-            <a:effectRef idx="0">
-              <a:schemeClr val="accent1"/>
-            </a:effectRef>
-            <a:fontRef idx="minor">
-              <a:schemeClr val="lt1"/>
-            </a:fontRef>
-          </p:style>
-          <p:txBody>
-            <a:bodyPr rtlCol="0" anchor="ctr"/>
-            <a:lstStyle/>
-            <a:p>
-              <a:pPr algn="ctr"/>
-              <a:endParaRPr lang="en-US" sz="1100" b="1" dirty="0">
-                <a:solidFill>
-                  <a:schemeClr val="accent2"/>
-                </a:solidFill>
-              </a:endParaRPr>
-            </a:p>
-          </p:txBody>
-        </p:sp>
-      </p:grpSp>
+          <a:prstGeom prst="rect">
+            <a:avLst/>
+          </a:prstGeom>
+        </p:spPr>
+      </p:pic>
+      <p:sp>
+        <p:nvSpPr>
+          <p:cNvPr id="69" name="Oval 68">
+            <a:extLst>
+              <a:ext uri="{FF2B5EF4-FFF2-40B4-BE49-F238E27FC236}">
+                <a16:creationId xmlns:a16="http://schemas.microsoft.com/office/drawing/2014/main" id="{E29F8453-1C90-4590-A696-78ED654CFD8E}"/>
+              </a:ext>
+            </a:extLst>
+          </p:cNvPr>
+          <p:cNvSpPr/>
+          <p:nvPr/>
+        </p:nvSpPr>
+        <p:spPr>
+          <a:xfrm>
+            <a:off x="3774381" y="2702508"/>
+            <a:ext cx="502482" cy="511297"/>
+          </a:xfrm>
+          <a:prstGeom prst="ellipse">
+            <a:avLst/>
+          </a:prstGeom>
+          <a:solidFill>
+            <a:schemeClr val="bg1"/>
+          </a:solidFill>
+          <a:ln>
+            <a:noFill/>
+          </a:ln>
+        </p:spPr>
+        <p:style>
+          <a:lnRef idx="2">
+            <a:schemeClr val="accent1">
+              <a:shade val="50000"/>
+            </a:schemeClr>
+          </a:lnRef>
+          <a:fillRef idx="1">
+            <a:schemeClr val="accent1"/>
+          </a:fillRef>
+          <a:effectRef idx="0">
+            <a:schemeClr val="accent1"/>
+          </a:effectRef>
+          <a:fontRef idx="minor">
+            <a:schemeClr val="lt1"/>
+          </a:fontRef>
+        </p:style>
+        <p:txBody>
+          <a:bodyPr rtlCol="0" anchor="ctr"/>
+          <a:lstStyle/>
+          <a:p>
+            <a:pPr algn="ctr"/>
+            <a:endParaRPr lang="en-US" sz="1100" b="1" dirty="0">
+              <a:solidFill>
+                <a:schemeClr val="accent2"/>
+              </a:solidFill>
+            </a:endParaRPr>
+          </a:p>
+        </p:txBody>
+      </p:sp>
       <p:sp>
         <p:nvSpPr>
           <p:cNvPr id="2" name="TextBox 1">
@@ -4996,7 +4980,7 @@
             <a:avLst/>
           </a:prstGeom>
           <a:solidFill>
-            <a:srgbClr val="F4960C"/>
+            <a:schemeClr val="accent1"/>
           </a:solidFill>
           <a:ln>
             <a:noFill/>
@@ -5454,7 +5438,7 @@
             <a:avLst/>
           </a:prstGeom>
           <a:solidFill>
-            <a:srgbClr val="F4960C"/>
+            <a:schemeClr val="accent1"/>
           </a:solidFill>
           <a:ln>
             <a:noFill/>

</xml_diff>

<commit_message>
Updated architecture image files
</commit_message>
<xml_diff>
--- a/semisupervisedFramework/Architecture.pptx
+++ b/semisupervisedFramework/Architecture.pptx
@@ -259,7 +259,7 @@
           <a:p>
             <a:fld id="{291BD508-DA94-4AF0-BB40-09E8F434B63E}" type="datetimeFigureOut">
               <a:rPr lang="en-US" smtClean="0"/>
-              <a:t>8/14/2019</a:t>
+              <a:t>9/23/2019</a:t>
             </a:fld>
             <a:endParaRPr lang="en-US"/>
           </a:p>
@@ -457,7 +457,7 @@
           <a:p>
             <a:fld id="{291BD508-DA94-4AF0-BB40-09E8F434B63E}" type="datetimeFigureOut">
               <a:rPr lang="en-US" smtClean="0"/>
-              <a:t>8/14/2019</a:t>
+              <a:t>9/23/2019</a:t>
             </a:fld>
             <a:endParaRPr lang="en-US"/>
           </a:p>
@@ -665,7 +665,7 @@
           <a:p>
             <a:fld id="{291BD508-DA94-4AF0-BB40-09E8F434B63E}" type="datetimeFigureOut">
               <a:rPr lang="en-US" smtClean="0"/>
-              <a:t>8/14/2019</a:t>
+              <a:t>9/23/2019</a:t>
             </a:fld>
             <a:endParaRPr lang="en-US"/>
           </a:p>
@@ -863,7 +863,7 @@
           <a:p>
             <a:fld id="{291BD508-DA94-4AF0-BB40-09E8F434B63E}" type="datetimeFigureOut">
               <a:rPr lang="en-US" smtClean="0"/>
-              <a:t>8/14/2019</a:t>
+              <a:t>9/23/2019</a:t>
             </a:fld>
             <a:endParaRPr lang="en-US"/>
           </a:p>
@@ -1138,7 +1138,7 @@
           <a:p>
             <a:fld id="{291BD508-DA94-4AF0-BB40-09E8F434B63E}" type="datetimeFigureOut">
               <a:rPr lang="en-US" smtClean="0"/>
-              <a:t>8/14/2019</a:t>
+              <a:t>9/23/2019</a:t>
             </a:fld>
             <a:endParaRPr lang="en-US"/>
           </a:p>
@@ -1403,7 +1403,7 @@
           <a:p>
             <a:fld id="{291BD508-DA94-4AF0-BB40-09E8F434B63E}" type="datetimeFigureOut">
               <a:rPr lang="en-US" smtClean="0"/>
-              <a:t>8/14/2019</a:t>
+              <a:t>9/23/2019</a:t>
             </a:fld>
             <a:endParaRPr lang="en-US"/>
           </a:p>
@@ -1815,7 +1815,7 @@
           <a:p>
             <a:fld id="{291BD508-DA94-4AF0-BB40-09E8F434B63E}" type="datetimeFigureOut">
               <a:rPr lang="en-US" smtClean="0"/>
-              <a:t>8/14/2019</a:t>
+              <a:t>9/23/2019</a:t>
             </a:fld>
             <a:endParaRPr lang="en-US"/>
           </a:p>
@@ -1956,7 +1956,7 @@
           <a:p>
             <a:fld id="{291BD508-DA94-4AF0-BB40-09E8F434B63E}" type="datetimeFigureOut">
               <a:rPr lang="en-US" smtClean="0"/>
-              <a:t>8/14/2019</a:t>
+              <a:t>9/23/2019</a:t>
             </a:fld>
             <a:endParaRPr lang="en-US"/>
           </a:p>
@@ -2069,7 +2069,7 @@
           <a:p>
             <a:fld id="{291BD508-DA94-4AF0-BB40-09E8F434B63E}" type="datetimeFigureOut">
               <a:rPr lang="en-US" smtClean="0"/>
-              <a:t>8/14/2019</a:t>
+              <a:t>9/23/2019</a:t>
             </a:fld>
             <a:endParaRPr lang="en-US"/>
           </a:p>
@@ -2380,7 +2380,7 @@
           <a:p>
             <a:fld id="{291BD508-DA94-4AF0-BB40-09E8F434B63E}" type="datetimeFigureOut">
               <a:rPr lang="en-US" smtClean="0"/>
-              <a:t>8/14/2019</a:t>
+              <a:t>9/23/2019</a:t>
             </a:fld>
             <a:endParaRPr lang="en-US"/>
           </a:p>
@@ -2668,7 +2668,7 @@
           <a:p>
             <a:fld id="{291BD508-DA94-4AF0-BB40-09E8F434B63E}" type="datetimeFigureOut">
               <a:rPr lang="en-US" smtClean="0"/>
-              <a:t>8/14/2019</a:t>
+              <a:t>9/23/2019</a:t>
             </a:fld>
             <a:endParaRPr lang="en-US"/>
           </a:p>
@@ -2909,7 +2909,7 @@
           <a:p>
             <a:fld id="{291BD508-DA94-4AF0-BB40-09E8F434B63E}" type="datetimeFigureOut">
               <a:rPr lang="en-US" smtClean="0"/>
-              <a:t>8/14/2019</a:t>
+              <a:t>9/23/2019</a:t>
             </a:fld>
             <a:endParaRPr lang="en-US"/>
           </a:p>
@@ -3326,6 +3326,58 @@
           <a:chExt cx="0" cy="0"/>
         </a:xfrm>
       </p:grpSpPr>
+      <p:sp>
+        <p:nvSpPr>
+          <p:cNvPr id="131" name="Arrow: Down 130">
+            <a:extLst>
+              <a:ext uri="{FF2B5EF4-FFF2-40B4-BE49-F238E27FC236}">
+                <a16:creationId xmlns:a16="http://schemas.microsoft.com/office/drawing/2014/main" id="{7C9446A3-D3CB-469B-8C76-8CAE4051BFB3}"/>
+              </a:ext>
+            </a:extLst>
+          </p:cNvPr>
+          <p:cNvSpPr/>
+          <p:nvPr/>
+        </p:nvSpPr>
+        <p:spPr>
+          <a:xfrm rot="16200000">
+            <a:off x="8716245" y="5261357"/>
+            <a:ext cx="203230" cy="1286954"/>
+          </a:xfrm>
+          <a:prstGeom prst="downArrow">
+            <a:avLst/>
+          </a:prstGeom>
+          <a:solidFill>
+            <a:schemeClr val="accent1"/>
+          </a:solidFill>
+          <a:ln>
+            <a:noFill/>
+          </a:ln>
+        </p:spPr>
+        <p:style>
+          <a:lnRef idx="2">
+            <a:schemeClr val="accent1">
+              <a:shade val="50000"/>
+            </a:schemeClr>
+          </a:lnRef>
+          <a:fillRef idx="1">
+            <a:schemeClr val="accent1"/>
+          </a:fillRef>
+          <a:effectRef idx="0">
+            <a:schemeClr val="accent1"/>
+          </a:effectRef>
+          <a:fontRef idx="minor">
+            <a:schemeClr val="lt1"/>
+          </a:fontRef>
+        </p:style>
+        <p:txBody>
+          <a:bodyPr rtlCol="0" anchor="ctr"/>
+          <a:lstStyle/>
+          <a:p>
+            <a:pPr algn="ctr"/>
+            <a:endParaRPr lang="en-US"/>
+          </a:p>
+        </p:txBody>
+      </p:sp>
       <p:pic>
         <p:nvPicPr>
           <p:cNvPr id="68" name="Picture 67">
@@ -5139,7 +5191,7 @@
         </p:nvSpPr>
         <p:spPr>
           <a:xfrm>
-            <a:off x="7759442" y="2779831"/>
+            <a:off x="8055781" y="2779831"/>
             <a:ext cx="1066318" cy="584775"/>
           </a:xfrm>
           <a:prstGeom prst="rect">
@@ -5346,8 +5398,8 @@
         </p:nvSpPr>
         <p:spPr>
           <a:xfrm>
-            <a:off x="7145654" y="3778007"/>
-            <a:ext cx="1286955" cy="276999"/>
+            <a:off x="10129094" y="5526218"/>
+            <a:ext cx="1528880" cy="276999"/>
           </a:xfrm>
           <a:prstGeom prst="rect">
             <a:avLst/>
@@ -5362,7 +5414,7 @@
           <a:p>
             <a:r>
               <a:rPr lang="en-US" sz="1200" dirty="0"/>
-              <a:t>&lt; 95% confidence</a:t>
+              <a:t>Open Source Data Viz</a:t>
             </a:r>
           </a:p>
         </p:txBody>
@@ -5561,7 +5613,7 @@
         </p:nvGrpSpPr>
         <p:grpSpPr>
           <a:xfrm>
-            <a:off x="6394677" y="2624178"/>
+            <a:off x="6394677" y="2640438"/>
             <a:ext cx="567892" cy="727923"/>
             <a:chOff x="8037147" y="2016188"/>
             <a:chExt cx="567892" cy="727923"/>
@@ -6155,7 +6207,7 @@
         </p:nvGrpSpPr>
         <p:grpSpPr>
           <a:xfrm>
-            <a:off x="7345813" y="2648230"/>
+            <a:off x="7709876" y="2640438"/>
             <a:ext cx="567892" cy="727923"/>
             <a:chOff x="8037147" y="2016188"/>
             <a:chExt cx="567892" cy="727923"/>
@@ -7067,8 +7119,8 @@
         </p:nvSpPr>
         <p:spPr>
           <a:xfrm>
-            <a:off x="8215598" y="5576408"/>
-            <a:ext cx="974113" cy="769441"/>
+            <a:off x="6679815" y="6161048"/>
+            <a:ext cx="1875221" cy="492443"/>
           </a:xfrm>
           <a:prstGeom prst="rect">
             <a:avLst/>
@@ -7076,7 +7128,7 @@
           <a:noFill/>
         </p:spPr>
         <p:txBody>
-          <a:bodyPr wrap="none" rtlCol="0">
+          <a:bodyPr wrap="square" rtlCol="0">
             <a:spAutoFit/>
           </a:bodyPr>
           <a:lstStyle/>
@@ -7084,14 +7136,7 @@
             <a:pPr algn="ctr"/>
             <a:r>
               <a:rPr lang="en-US" dirty="0"/>
-              <a:t>Analysis</a:t>
-            </a:r>
-          </a:p>
-          <a:p>
-            <a:pPr algn="ctr"/>
-            <a:r>
-              <a:rPr lang="en-US" dirty="0"/>
-              <a:t>Results</a:t>
+              <a:t>Analysis Results</a:t>
             </a:r>
           </a:p>
           <a:p>
@@ -8025,6 +8070,569 @@
               <a:rPr lang="en-US" sz="2000" dirty="0"/>
               <a:t>Components</a:t>
             </a:r>
+          </a:p>
+        </p:txBody>
+      </p:sp>
+      <p:sp>
+        <p:nvSpPr>
+          <p:cNvPr id="108" name="Arrow: Down 107">
+            <a:extLst>
+              <a:ext uri="{FF2B5EF4-FFF2-40B4-BE49-F238E27FC236}">
+                <a16:creationId xmlns:a16="http://schemas.microsoft.com/office/drawing/2014/main" id="{7BB48329-BAC5-48CD-856D-A77A7E423DBA}"/>
+              </a:ext>
+            </a:extLst>
+          </p:cNvPr>
+          <p:cNvSpPr/>
+          <p:nvPr/>
+        </p:nvSpPr>
+        <p:spPr>
+          <a:xfrm rot="16200000">
+            <a:off x="1645986" y="5671525"/>
+            <a:ext cx="221064" cy="579205"/>
+          </a:xfrm>
+          <a:prstGeom prst="downArrow">
+            <a:avLst/>
+          </a:prstGeom>
+          <a:solidFill>
+            <a:schemeClr val="accent1"/>
+          </a:solidFill>
+          <a:ln>
+            <a:noFill/>
+          </a:ln>
+        </p:spPr>
+        <p:style>
+          <a:lnRef idx="2">
+            <a:schemeClr val="accent1">
+              <a:shade val="50000"/>
+            </a:schemeClr>
+          </a:lnRef>
+          <a:fillRef idx="1">
+            <a:schemeClr val="accent1"/>
+          </a:fillRef>
+          <a:effectRef idx="0">
+            <a:schemeClr val="accent1"/>
+          </a:effectRef>
+          <a:fontRef idx="minor">
+            <a:schemeClr val="lt1"/>
+          </a:fontRef>
+        </p:style>
+        <p:txBody>
+          <a:bodyPr rtlCol="0" anchor="ctr"/>
+          <a:lstStyle/>
+          <a:p>
+            <a:pPr algn="ctr"/>
+            <a:endParaRPr lang="en-US"/>
+          </a:p>
+        </p:txBody>
+      </p:sp>
+      <p:sp>
+        <p:nvSpPr>
+          <p:cNvPr id="110" name="Arrow: Right 109">
+            <a:extLst>
+              <a:ext uri="{FF2B5EF4-FFF2-40B4-BE49-F238E27FC236}">
+                <a16:creationId xmlns:a16="http://schemas.microsoft.com/office/drawing/2014/main" id="{EDECF5CD-4980-4232-8C1E-D24021F6226E}"/>
+              </a:ext>
+            </a:extLst>
+          </p:cNvPr>
+          <p:cNvSpPr/>
+          <p:nvPr/>
+        </p:nvSpPr>
+        <p:spPr>
+          <a:xfrm>
+            <a:off x="1466916" y="6165786"/>
+            <a:ext cx="579206" cy="180063"/>
+          </a:xfrm>
+          <a:prstGeom prst="rightArrow">
+            <a:avLst>
+              <a:gd name="adj1" fmla="val 41878"/>
+              <a:gd name="adj2" fmla="val 50000"/>
+            </a:avLst>
+          </a:prstGeom>
+          <a:solidFill>
+            <a:srgbClr val="F4960C"/>
+          </a:solidFill>
+          <a:ln>
+            <a:solidFill>
+              <a:srgbClr val="F4960C"/>
+            </a:solidFill>
+          </a:ln>
+        </p:spPr>
+        <p:style>
+          <a:lnRef idx="2">
+            <a:schemeClr val="accent1">
+              <a:shade val="50000"/>
+            </a:schemeClr>
+          </a:lnRef>
+          <a:fillRef idx="1">
+            <a:schemeClr val="accent1"/>
+          </a:fillRef>
+          <a:effectRef idx="0">
+            <a:schemeClr val="accent1"/>
+          </a:effectRef>
+          <a:fontRef idx="minor">
+            <a:schemeClr val="lt1"/>
+          </a:fontRef>
+        </p:style>
+        <p:txBody>
+          <a:bodyPr rtlCol="0" anchor="ctr"/>
+          <a:lstStyle/>
+          <a:p>
+            <a:pPr algn="ctr"/>
+            <a:endParaRPr lang="en-US"/>
+          </a:p>
+        </p:txBody>
+      </p:sp>
+      <p:sp>
+        <p:nvSpPr>
+          <p:cNvPr id="111" name="TextBox 110">
+            <a:extLst>
+              <a:ext uri="{FF2B5EF4-FFF2-40B4-BE49-F238E27FC236}">
+                <a16:creationId xmlns:a16="http://schemas.microsoft.com/office/drawing/2014/main" id="{A3E6AE20-5457-4184-B2EB-935DEE368906}"/>
+              </a:ext>
+            </a:extLst>
+          </p:cNvPr>
+          <p:cNvSpPr txBox="1"/>
+          <p:nvPr/>
+        </p:nvSpPr>
+        <p:spPr>
+          <a:xfrm>
+            <a:off x="1305112" y="6397640"/>
+            <a:ext cx="902811" cy="253916"/>
+          </a:xfrm>
+          <a:prstGeom prst="rect">
+            <a:avLst/>
+          </a:prstGeom>
+          <a:noFill/>
+        </p:spPr>
+        <p:txBody>
+          <a:bodyPr wrap="none" rtlCol="0">
+            <a:spAutoFit/>
+          </a:bodyPr>
+          <a:lstStyle/>
+          <a:p>
+            <a:pPr algn="ctr"/>
+            <a:r>
+              <a:rPr lang="en-US" sz="1050" dirty="0"/>
+              <a:t>(parenthesis)</a:t>
+            </a:r>
+            <a:endParaRPr lang="en-US" sz="2800" dirty="0"/>
+          </a:p>
+        </p:txBody>
+      </p:sp>
+      <p:sp>
+        <p:nvSpPr>
+          <p:cNvPr id="114" name="TextBox 113">
+            <a:extLst>
+              <a:ext uri="{FF2B5EF4-FFF2-40B4-BE49-F238E27FC236}">
+                <a16:creationId xmlns:a16="http://schemas.microsoft.com/office/drawing/2014/main" id="{85FA4846-6C8C-4662-B152-0A2F34B14EEF}"/>
+              </a:ext>
+            </a:extLst>
+          </p:cNvPr>
+          <p:cNvSpPr txBox="1"/>
+          <p:nvPr/>
+        </p:nvSpPr>
+        <p:spPr>
+          <a:xfrm>
+            <a:off x="2101181" y="5834169"/>
+            <a:ext cx="1447833" cy="253916"/>
+          </a:xfrm>
+          <a:prstGeom prst="rect">
+            <a:avLst/>
+          </a:prstGeom>
+          <a:noFill/>
+        </p:spPr>
+        <p:txBody>
+          <a:bodyPr wrap="none" rtlCol="0">
+            <a:spAutoFit/>
+          </a:bodyPr>
+          <a:lstStyle/>
+          <a:p>
+            <a:pPr algn="ctr"/>
+            <a:r>
+              <a:rPr lang="en-US" sz="1050" dirty="0"/>
+              <a:t>Azure standard feature</a:t>
+            </a:r>
+            <a:endParaRPr lang="en-US" sz="2800" dirty="0"/>
+          </a:p>
+        </p:txBody>
+      </p:sp>
+      <p:sp>
+        <p:nvSpPr>
+          <p:cNvPr id="115" name="TextBox 114">
+            <a:extLst>
+              <a:ext uri="{FF2B5EF4-FFF2-40B4-BE49-F238E27FC236}">
+                <a16:creationId xmlns:a16="http://schemas.microsoft.com/office/drawing/2014/main" id="{081701C0-1763-474C-863E-55844ADF3367}"/>
+              </a:ext>
+            </a:extLst>
+          </p:cNvPr>
+          <p:cNvSpPr txBox="1"/>
+          <p:nvPr/>
+        </p:nvSpPr>
+        <p:spPr>
+          <a:xfrm>
+            <a:off x="2115968" y="6134080"/>
+            <a:ext cx="1401346" cy="253916"/>
+          </a:xfrm>
+          <a:prstGeom prst="rect">
+            <a:avLst/>
+          </a:prstGeom>
+          <a:noFill/>
+        </p:spPr>
+        <p:txBody>
+          <a:bodyPr wrap="none" rtlCol="0">
+            <a:spAutoFit/>
+          </a:bodyPr>
+          <a:lstStyle/>
+          <a:p>
+            <a:pPr algn="ctr"/>
+            <a:r>
+              <a:rPr lang="en-US" sz="1050" dirty="0"/>
+              <a:t>ML Professoar feature</a:t>
+            </a:r>
+            <a:endParaRPr lang="en-US" sz="2800" dirty="0"/>
+          </a:p>
+        </p:txBody>
+      </p:sp>
+      <p:sp>
+        <p:nvSpPr>
+          <p:cNvPr id="116" name="TextBox 115">
+            <a:extLst>
+              <a:ext uri="{FF2B5EF4-FFF2-40B4-BE49-F238E27FC236}">
+                <a16:creationId xmlns:a16="http://schemas.microsoft.com/office/drawing/2014/main" id="{D7C2824E-3196-485A-B09F-AC4F465E0699}"/>
+              </a:ext>
+            </a:extLst>
+          </p:cNvPr>
+          <p:cNvSpPr txBox="1"/>
+          <p:nvPr/>
+        </p:nvSpPr>
+        <p:spPr>
+          <a:xfrm>
+            <a:off x="2123784" y="6397640"/>
+            <a:ext cx="1588897" cy="253916"/>
+          </a:xfrm>
+          <a:prstGeom prst="rect">
+            <a:avLst/>
+          </a:prstGeom>
+          <a:noFill/>
+        </p:spPr>
+        <p:txBody>
+          <a:bodyPr wrap="none" rtlCol="0">
+            <a:spAutoFit/>
+          </a:bodyPr>
+          <a:lstStyle/>
+          <a:p>
+            <a:pPr algn="ctr"/>
+            <a:r>
+              <a:rPr lang="en-US" sz="1050" dirty="0"/>
+              <a:t>ML Professoar item name</a:t>
+            </a:r>
+            <a:endParaRPr lang="en-US" sz="2800" dirty="0"/>
+          </a:p>
+        </p:txBody>
+      </p:sp>
+      <p:sp>
+        <p:nvSpPr>
+          <p:cNvPr id="7" name="Flowchart: Manual Operation 6">
+            <a:extLst>
+              <a:ext uri="{FF2B5EF4-FFF2-40B4-BE49-F238E27FC236}">
+                <a16:creationId xmlns:a16="http://schemas.microsoft.com/office/drawing/2014/main" id="{2566467E-2593-4131-BF2A-360511801DC4}"/>
+              </a:ext>
+            </a:extLst>
+          </p:cNvPr>
+          <p:cNvSpPr/>
+          <p:nvPr/>
+        </p:nvSpPr>
+        <p:spPr>
+          <a:xfrm>
+            <a:off x="7024712" y="2830197"/>
+            <a:ext cx="692757" cy="414267"/>
+          </a:xfrm>
+          <a:prstGeom prst="flowChartManualOperation">
+            <a:avLst/>
+          </a:prstGeom>
+        </p:spPr>
+        <p:style>
+          <a:lnRef idx="2">
+            <a:schemeClr val="accent1">
+              <a:shade val="50000"/>
+            </a:schemeClr>
+          </a:lnRef>
+          <a:fillRef idx="1">
+            <a:schemeClr val="accent1"/>
+          </a:fillRef>
+          <a:effectRef idx="0">
+            <a:schemeClr val="accent1"/>
+          </a:effectRef>
+          <a:fontRef idx="minor">
+            <a:schemeClr val="lt1"/>
+          </a:fontRef>
+        </p:style>
+        <p:txBody>
+          <a:bodyPr rtlCol="0" anchor="ctr"/>
+          <a:lstStyle/>
+          <a:p>
+            <a:pPr algn="ctr"/>
+            <a:endParaRPr lang="en-US" dirty="0"/>
+          </a:p>
+        </p:txBody>
+      </p:sp>
+      <p:sp>
+        <p:nvSpPr>
+          <p:cNvPr id="124" name="TextBox 123">
+            <a:extLst>
+              <a:ext uri="{FF2B5EF4-FFF2-40B4-BE49-F238E27FC236}">
+                <a16:creationId xmlns:a16="http://schemas.microsoft.com/office/drawing/2014/main" id="{91B89C4D-8E58-46E4-B5F8-3B8AE23552FA}"/>
+              </a:ext>
+            </a:extLst>
+          </p:cNvPr>
+          <p:cNvSpPr txBox="1"/>
+          <p:nvPr/>
+        </p:nvSpPr>
+        <p:spPr>
+          <a:xfrm>
+            <a:off x="7015155" y="2447515"/>
+            <a:ext cx="702436" cy="384721"/>
+          </a:xfrm>
+          <a:prstGeom prst="rect">
+            <a:avLst/>
+          </a:prstGeom>
+          <a:noFill/>
+        </p:spPr>
+        <p:txBody>
+          <a:bodyPr wrap="none" rtlCol="0">
+            <a:spAutoFit/>
+          </a:bodyPr>
+          <a:lstStyle/>
+          <a:p>
+            <a:pPr algn="ctr"/>
+            <a:r>
+              <a:rPr lang="en-US" sz="1200" dirty="0"/>
+              <a:t>Labeling</a:t>
+            </a:r>
+          </a:p>
+          <a:p>
+            <a:pPr algn="ctr"/>
+            <a:r>
+              <a:rPr lang="en-US" sz="700" dirty="0"/>
+              <a:t>(</a:t>
+            </a:r>
+            <a:r>
+              <a:rPr lang="en-US" sz="700" dirty="0" err="1"/>
+              <a:t>eg</a:t>
+            </a:r>
+            <a:r>
+              <a:rPr lang="en-US" sz="700" dirty="0"/>
+              <a:t> </a:t>
+            </a:r>
+            <a:r>
+              <a:rPr lang="en-US" sz="700" dirty="0" err="1"/>
+              <a:t>VoTT</a:t>
+            </a:r>
+            <a:r>
+              <a:rPr lang="en-US" sz="700" dirty="0"/>
+              <a:t>)</a:t>
+            </a:r>
+          </a:p>
+        </p:txBody>
+      </p:sp>
+      <p:pic>
+        <p:nvPicPr>
+          <p:cNvPr id="11" name="Picture 10">
+            <a:extLst>
+              <a:ext uri="{FF2B5EF4-FFF2-40B4-BE49-F238E27FC236}">
+                <a16:creationId xmlns:a16="http://schemas.microsoft.com/office/drawing/2014/main" id="{CA0F6A7F-5781-45BD-AE77-ED2EC7040C89}"/>
+              </a:ext>
+            </a:extLst>
+          </p:cNvPr>
+          <p:cNvPicPr>
+            <a:picLocks noChangeAspect="1"/>
+          </p:cNvPicPr>
+          <p:nvPr/>
+        </p:nvPicPr>
+        <p:blipFill>
+          <a:blip r:embed="rId3"/>
+          <a:stretch>
+            <a:fillRect/>
+          </a:stretch>
+        </p:blipFill>
+        <p:spPr>
+          <a:xfrm>
+            <a:off x="9657332" y="5507729"/>
+            <a:ext cx="427403" cy="393483"/>
+          </a:xfrm>
+          <a:prstGeom prst="rect">
+            <a:avLst/>
+          </a:prstGeom>
+        </p:spPr>
+      </p:pic>
+      <p:pic>
+        <p:nvPicPr>
+          <p:cNvPr id="14" name="Picture 13">
+            <a:extLst>
+              <a:ext uri="{FF2B5EF4-FFF2-40B4-BE49-F238E27FC236}">
+                <a16:creationId xmlns:a16="http://schemas.microsoft.com/office/drawing/2014/main" id="{E4C5AFDF-2F17-4DAA-9BF7-931858D73CC1}"/>
+              </a:ext>
+            </a:extLst>
+          </p:cNvPr>
+          <p:cNvPicPr>
+            <a:picLocks noChangeAspect="1"/>
+          </p:cNvPicPr>
+          <p:nvPr/>
+        </p:nvPicPr>
+        <p:blipFill>
+          <a:blip r:embed="rId4">
+            <a:extLst>
+              <a:ext uri="{28A0092B-C50C-407E-A947-70E740481C1C}">
+                <a14:useLocalDpi xmlns:a14="http://schemas.microsoft.com/office/drawing/2010/main" val="0"/>
+              </a:ext>
+            </a:extLst>
+          </a:blip>
+          <a:stretch>
+            <a:fillRect/>
+          </a:stretch>
+        </p:blipFill>
+        <p:spPr>
+          <a:xfrm>
+            <a:off x="9462454" y="6031653"/>
+            <a:ext cx="840248" cy="441130"/>
+          </a:xfrm>
+          <a:prstGeom prst="rect">
+            <a:avLst/>
+          </a:prstGeom>
+        </p:spPr>
+      </p:pic>
+      <p:sp>
+        <p:nvSpPr>
+          <p:cNvPr id="15" name="Flowchart: Process 14">
+            <a:extLst>
+              <a:ext uri="{FF2B5EF4-FFF2-40B4-BE49-F238E27FC236}">
+                <a16:creationId xmlns:a16="http://schemas.microsoft.com/office/drawing/2014/main" id="{A0F80055-1E0A-49F6-B299-1FC214B004F9}"/>
+              </a:ext>
+            </a:extLst>
+          </p:cNvPr>
+          <p:cNvSpPr/>
+          <p:nvPr/>
+        </p:nvSpPr>
+        <p:spPr>
+          <a:xfrm>
+            <a:off x="8499473" y="5678138"/>
+            <a:ext cx="637974" cy="481040"/>
+          </a:xfrm>
+          <a:prstGeom prst="flowChartProcess">
+            <a:avLst/>
+          </a:prstGeom>
+        </p:spPr>
+        <p:style>
+          <a:lnRef idx="2">
+            <a:schemeClr val="accent1">
+              <a:shade val="50000"/>
+            </a:schemeClr>
+          </a:lnRef>
+          <a:fillRef idx="1">
+            <a:schemeClr val="accent1"/>
+          </a:fillRef>
+          <a:effectRef idx="0">
+            <a:schemeClr val="accent1"/>
+          </a:effectRef>
+          <a:fontRef idx="minor">
+            <a:schemeClr val="lt1"/>
+          </a:fontRef>
+        </p:style>
+        <p:txBody>
+          <a:bodyPr rtlCol="0" anchor="ctr"/>
+          <a:lstStyle/>
+          <a:p>
+            <a:pPr algn="ctr"/>
+            <a:r>
+              <a:rPr lang="en-US" dirty="0"/>
+              <a:t>ADF</a:t>
+            </a:r>
+          </a:p>
+        </p:txBody>
+      </p:sp>
+      <p:sp>
+        <p:nvSpPr>
+          <p:cNvPr id="126" name="TextBox 125">
+            <a:extLst>
+              <a:ext uri="{FF2B5EF4-FFF2-40B4-BE49-F238E27FC236}">
+                <a16:creationId xmlns:a16="http://schemas.microsoft.com/office/drawing/2014/main" id="{B592D211-C9CC-42C8-99EE-BCF091ED2FB4}"/>
+              </a:ext>
+            </a:extLst>
+          </p:cNvPr>
+          <p:cNvSpPr txBox="1"/>
+          <p:nvPr/>
+        </p:nvSpPr>
+        <p:spPr>
+          <a:xfrm>
+            <a:off x="7298054" y="3930407"/>
+            <a:ext cx="1286955" cy="400110"/>
+          </a:xfrm>
+          <a:prstGeom prst="rect">
+            <a:avLst/>
+          </a:prstGeom>
+          <a:noFill/>
+        </p:spPr>
+        <p:txBody>
+          <a:bodyPr wrap="none" rtlCol="0">
+            <a:spAutoFit/>
+          </a:bodyPr>
+          <a:lstStyle/>
+          <a:p>
+            <a:r>
+              <a:rPr lang="en-US" sz="1200" dirty="0"/>
+              <a:t>&lt; 95% confidence</a:t>
+            </a:r>
+          </a:p>
+          <a:p>
+            <a:r>
+              <a:rPr lang="en-US" sz="800" dirty="0"/>
+              <a:t>(</a:t>
+            </a:r>
+            <a:r>
+              <a:rPr lang="en-US" sz="800" dirty="0" err="1"/>
+              <a:t>confidenceThreshold</a:t>
+            </a:r>
+            <a:r>
+              <a:rPr lang="en-US" sz="800" dirty="0"/>
+              <a:t>)</a:t>
+            </a:r>
+            <a:endParaRPr lang="en-US" dirty="0"/>
+          </a:p>
+        </p:txBody>
+      </p:sp>
+      <p:sp>
+        <p:nvSpPr>
+          <p:cNvPr id="128" name="TextBox 127">
+            <a:extLst>
+              <a:ext uri="{FF2B5EF4-FFF2-40B4-BE49-F238E27FC236}">
+                <a16:creationId xmlns:a16="http://schemas.microsoft.com/office/drawing/2014/main" id="{010B52F0-C0D4-4FCB-B4EA-F3090FA3E6B9}"/>
+              </a:ext>
+            </a:extLst>
+          </p:cNvPr>
+          <p:cNvSpPr txBox="1"/>
+          <p:nvPr/>
+        </p:nvSpPr>
+        <p:spPr>
+          <a:xfrm>
+            <a:off x="10233075" y="6081951"/>
+            <a:ext cx="1440394" cy="276999"/>
+          </a:xfrm>
+          <a:prstGeom prst="rect">
+            <a:avLst/>
+          </a:prstGeom>
+          <a:noFill/>
+        </p:spPr>
+        <p:txBody>
+          <a:bodyPr wrap="none" rtlCol="0">
+            <a:spAutoFit/>
+          </a:bodyPr>
+          <a:lstStyle/>
+          <a:p>
+            <a:r>
+              <a:rPr lang="en-US" sz="1200" dirty="0"/>
+              <a:t>Data Warehouse Viz</a:t>
+            </a:r>
+            <a:endParaRPr lang="en-US" dirty="0"/>
           </a:p>
         </p:txBody>
       </p:sp>

</xml_diff>